<commit_message>
links para home adicionados nas páginas
</commit_message>
<xml_diff>
--- a/api-site/public/HISTÓRIA DO CINEMA.pptx
+++ b/api-site/public/HISTÓRIA DO CINEMA.pptx
@@ -6,8 +6,9 @@
   </p:sldMasterIdLst>
   <p:sldIdLst>
     <p:sldId id="256" r:id="rId2"/>
-    <p:sldId id="257" r:id="rId3"/>
-    <p:sldId id="258" r:id="rId4"/>
+    <p:sldId id="259" r:id="rId3"/>
+    <p:sldId id="257" r:id="rId4"/>
+    <p:sldId id="258" r:id="rId5"/>
   </p:sldIdLst>
   <p:sldSz cx="12192000" cy="6858000"/>
   <p:notesSz cx="6858000" cy="9144000"/>
@@ -3841,59 +3842,83 @@
           <a:p>
             <a:pPr algn="l"/>
             <a:r>
-              <a:rPr lang="pt-BR" altLang="pt-BR" sz="3000" smtClean="0"/>
+              <a:rPr lang="pt-BR" altLang="pt-BR" sz="3000" dirty="0" smtClean="0"/>
               <a:t/>
             </a:r>
             <a:br>
-              <a:rPr lang="pt-BR" altLang="pt-BR" sz="3000" smtClean="0"/>
+              <a:rPr lang="pt-BR" altLang="pt-BR" sz="3000" dirty="0" smtClean="0"/>
             </a:br>
             <a:r>
-              <a:rPr lang="pt-BR" altLang="pt-BR" sz="3000" smtClean="0"/>
+              <a:rPr lang="pt-BR" altLang="pt-BR" sz="3000" dirty="0" smtClean="0"/>
               <a:t/>
             </a:r>
             <a:br>
-              <a:rPr lang="pt-BR" altLang="pt-BR" sz="3000" smtClean="0"/>
+              <a:rPr lang="pt-BR" altLang="pt-BR" sz="3000" dirty="0" smtClean="0"/>
             </a:br>
             <a:r>
-              <a:rPr lang="pt-BR" altLang="pt-BR" sz="3000" b="1" smtClean="0"/>
+              <a:rPr lang="pt-BR" altLang="pt-BR" sz="3000" b="1" dirty="0" smtClean="0"/>
               <a:t/>
             </a:r>
             <a:br>
-              <a:rPr lang="pt-BR" altLang="pt-BR" sz="3000" b="1" smtClean="0"/>
+              <a:rPr lang="pt-BR" altLang="pt-BR" sz="3000" b="1" dirty="0" smtClean="0"/>
             </a:br>
             <a:r>
-              <a:rPr lang="pt-BR" altLang="pt-BR" sz="3000" b="1" smtClean="0"/>
-              <a:t>- Problema educacional no Brasil</a:t>
+              <a:rPr lang="pt-BR" altLang="pt-BR" sz="3000" b="1" dirty="0" smtClean="0"/>
+              <a:t>- </a:t>
+            </a:r>
+            <a:r>
+              <a:rPr lang="pt-BR" altLang="pt-BR" sz="3000" b="1" dirty="0" smtClean="0"/>
+              <a:t>Valores associados à pensar ao cont</a:t>
+            </a:r>
+            <a:r>
+              <a:rPr lang="pt-BR" altLang="pt-BR" sz="3000" b="1" dirty="0" smtClean="0"/>
+              <a:t>rário</a:t>
+            </a:r>
+            <a:r>
+              <a:rPr lang="pt-BR" altLang="pt-BR" sz="3000" b="1" dirty="0" smtClean="0"/>
+              <a:t/>
             </a:r>
             <a:br>
-              <a:rPr lang="pt-BR" altLang="pt-BR" sz="3000" b="1" smtClean="0"/>
+              <a:rPr lang="pt-BR" altLang="pt-BR" sz="3000" b="1" dirty="0" smtClean="0"/>
             </a:br>
             <a:r>
-              <a:rPr lang="pt-BR" altLang="pt-BR" sz="3000" b="1" smtClean="0"/>
+              <a:rPr lang="pt-BR" altLang="pt-BR" sz="3000" b="1" dirty="0" smtClean="0"/>
               <a:t/>
             </a:r>
             <a:br>
-              <a:rPr lang="pt-BR" altLang="pt-BR" sz="3000" b="1" smtClean="0"/>
+              <a:rPr lang="pt-BR" altLang="pt-BR" sz="3000" b="1" dirty="0" smtClean="0"/>
             </a:br>
             <a:r>
-              <a:rPr lang="pt-BR" altLang="pt-BR" sz="3000" b="1" smtClean="0"/>
-              <a:t>- Consumo cultural mais elitizado</a:t>
+              <a:rPr lang="pt-BR" altLang="pt-BR" sz="3000" b="1" dirty="0" smtClean="0"/>
+              <a:t>- </a:t>
+            </a:r>
+            <a:r>
+              <a:rPr lang="pt-BR" altLang="pt-BR" sz="3000" b="1" dirty="0" smtClean="0"/>
+              <a:t>Encanto </a:t>
+            </a:r>
+            <a:r>
+              <a:rPr lang="pt-BR" altLang="pt-BR" sz="3000" b="1" dirty="0" smtClean="0"/>
+              <a:t/>
             </a:r>
             <a:br>
-              <a:rPr lang="pt-BR" altLang="pt-BR" sz="3000" b="1" smtClean="0"/>
+              <a:rPr lang="pt-BR" altLang="pt-BR" sz="3000" b="1" dirty="0" smtClean="0"/>
             </a:br>
             <a:r>
-              <a:rPr lang="pt-BR" altLang="pt-BR" sz="3000" b="1" smtClean="0"/>
+              <a:rPr lang="pt-BR" altLang="pt-BR" sz="3000" b="1" dirty="0" smtClean="0"/>
               <a:t/>
             </a:r>
             <a:br>
-              <a:rPr lang="pt-BR" altLang="pt-BR" sz="3000" b="1" smtClean="0"/>
+              <a:rPr lang="pt-BR" altLang="pt-BR" sz="3000" b="1" dirty="0" smtClean="0"/>
             </a:br>
             <a:r>
-              <a:rPr lang="pt-BR" altLang="pt-BR" sz="3000" b="1" smtClean="0"/>
-              <a:t>- Democratização impulsionada pela tecnologia</a:t>
-            </a:r>
-            <a:endParaRPr lang="pt-BR" altLang="pt-BR" sz="3000" b="1" smtClean="0">
+              <a:rPr lang="pt-BR" altLang="pt-BR" sz="3000" b="1" dirty="0" smtClean="0"/>
+              <a:t>- </a:t>
+            </a:r>
+            <a:r>
+              <a:rPr lang="pt-BR" altLang="pt-BR" sz="3000" b="1" dirty="0" smtClean="0"/>
+              <a:t>A diversidade do mundo diante dos olhos</a:t>
+            </a:r>
+            <a:endParaRPr lang="pt-BR" altLang="pt-BR" sz="3000" b="1" dirty="0" smtClean="0">
               <a:latin typeface="Bahnschrift SemiBold Condensed" panose="020B0502040204020203" pitchFamily="34" charset="0"/>
             </a:endParaRPr>
           </a:p>
@@ -3909,7 +3934,7 @@
         </p:nvSpPr>
         <p:spPr bwMode="auto">
           <a:xfrm>
-            <a:off x="-639763" y="930275"/>
+            <a:off x="-300129" y="917212"/>
             <a:ext cx="9144001" cy="1231900"/>
           </a:xfrm>
           <a:prstGeom prst="rect">
@@ -4046,6 +4071,352 @@
               </a:lnSpc>
             </a:pPr>
             <a:r>
+              <a:rPr lang="pt-BR" altLang="pt-BR" sz="7500" dirty="0" smtClean="0">
+                <a:latin typeface="Bahnschrift SemiBold Condensed" panose="020B0502040204020203" pitchFamily="34" charset="0"/>
+              </a:rPr>
+              <a:t>            POR QUE ESSE TEMA?</a:t>
+            </a:r>
+            <a:endParaRPr lang="pt-BR" altLang="pt-BR" sz="7500" dirty="0">
+              <a:latin typeface="Bahnschrift SemiBold Condensed" panose="020B0502040204020203" pitchFamily="34" charset="0"/>
+            </a:endParaRPr>
+          </a:p>
+        </p:txBody>
+      </p:sp>
+    </p:spTree>
+    <p:extLst>
+      <p:ext uri="{BB962C8B-B14F-4D97-AF65-F5344CB8AC3E}">
+        <p14:creationId xmlns:p14="http://schemas.microsoft.com/office/powerpoint/2010/main" val="1421873220"/>
+      </p:ext>
+    </p:extLst>
+  </p:cSld>
+  <p:clrMapOvr>
+    <a:masterClrMapping/>
+  </p:clrMapOvr>
+  <p:transition spd="slow">
+    <p:push dir="u"/>
+  </p:transition>
+  <p:timing>
+    <p:tnLst>
+      <p:par>
+        <p:cTn id="1" dur="indefinite" restart="never" nodeType="tmRoot"/>
+      </p:par>
+    </p:tnLst>
+  </p:timing>
+</p:sld>
+</file>
+
+<file path=ppt/slides/slide3.xml><?xml version="1.0" encoding="utf-8"?>
+<p:sld xmlns:a="http://schemas.openxmlformats.org/drawingml/2006/main" xmlns:r="http://schemas.openxmlformats.org/officeDocument/2006/relationships" xmlns:p="http://schemas.openxmlformats.org/presentationml/2006/main">
+  <p:cSld>
+    <p:bg>
+      <p:bgPr>
+        <a:blipFill dpi="0" rotWithShape="0">
+          <a:blip r:embed="rId2">
+            <a:lum/>
+          </a:blip>
+          <a:srcRect/>
+          <a:stretch>
+            <a:fillRect/>
+          </a:stretch>
+        </a:blipFill>
+        <a:effectLst/>
+      </p:bgPr>
+    </p:bg>
+    <p:spTree>
+      <p:nvGrpSpPr>
+        <p:cNvPr id="1" name=""/>
+        <p:cNvGrpSpPr/>
+        <p:nvPr/>
+      </p:nvGrpSpPr>
+      <p:grpSpPr>
+        <a:xfrm>
+          <a:off x="0" y="0"/>
+          <a:ext cx="0" cy="0"/>
+          <a:chOff x="0" y="0"/>
+          <a:chExt cx="0" cy="0"/>
+        </a:xfrm>
+      </p:grpSpPr>
+      <p:sp>
+        <p:nvSpPr>
+          <p:cNvPr id="5" name="Retângulo 4"/>
+          <p:cNvSpPr/>
+          <p:nvPr/>
+        </p:nvSpPr>
+        <p:spPr>
+          <a:xfrm>
+            <a:off x="2484438" y="1311275"/>
+            <a:ext cx="7192962" cy="3581400"/>
+          </a:xfrm>
+          <a:prstGeom prst="rect">
+            <a:avLst/>
+          </a:prstGeom>
+          <a:solidFill>
+            <a:schemeClr val="bg1"/>
+          </a:solidFill>
+          <a:ln>
+            <a:noFill/>
+          </a:ln>
+        </p:spPr>
+        <p:style>
+          <a:lnRef idx="2">
+            <a:schemeClr val="accent1">
+              <a:shade val="50000"/>
+            </a:schemeClr>
+          </a:lnRef>
+          <a:fillRef idx="1">
+            <a:schemeClr val="accent1"/>
+          </a:fillRef>
+          <a:effectRef idx="0">
+            <a:schemeClr val="accent1"/>
+          </a:effectRef>
+          <a:fontRef idx="minor">
+            <a:schemeClr val="lt1"/>
+          </a:fontRef>
+        </p:style>
+        <p:txBody>
+          <a:bodyPr anchor="ctr"/>
+          <a:lstStyle/>
+          <a:p>
+            <a:pPr algn="ctr" eaLnBrk="1" fontAlgn="auto" hangingPunct="1">
+              <a:spcBef>
+                <a:spcPts val="0"/>
+              </a:spcBef>
+              <a:spcAft>
+                <a:spcPts val="0"/>
+              </a:spcAft>
+              <a:defRPr/>
+            </a:pPr>
+            <a:endParaRPr lang="pt-BR"/>
+          </a:p>
+        </p:txBody>
+      </p:sp>
+      <p:sp>
+        <p:nvSpPr>
+          <p:cNvPr id="3075" name="Título 1"/>
+          <p:cNvSpPr>
+            <a:spLocks noGrp="1"/>
+          </p:cNvSpPr>
+          <p:nvPr>
+            <p:ph type="ctrTitle"/>
+          </p:nvPr>
+        </p:nvSpPr>
+        <p:spPr>
+          <a:xfrm>
+            <a:off x="2087563" y="3703638"/>
+            <a:ext cx="9144000" cy="1406525"/>
+          </a:xfrm>
+        </p:spPr>
+        <p:txBody>
+          <a:bodyPr/>
+          <a:lstStyle/>
+          <a:p>
+            <a:pPr algn="l"/>
+            <a:r>
+              <a:rPr lang="pt-BR" altLang="pt-BR" sz="3000" dirty="0" smtClean="0"/>
+              <a:t/>
+            </a:r>
+            <a:br>
+              <a:rPr lang="pt-BR" altLang="pt-BR" sz="3000" dirty="0" smtClean="0"/>
+            </a:br>
+            <a:r>
+              <a:rPr lang="pt-BR" altLang="pt-BR" sz="3000" dirty="0" smtClean="0"/>
+              <a:t/>
+            </a:r>
+            <a:br>
+              <a:rPr lang="pt-BR" altLang="pt-BR" sz="3000" dirty="0" smtClean="0"/>
+            </a:br>
+            <a:r>
+              <a:rPr lang="pt-BR" altLang="pt-BR" sz="3000" b="1" dirty="0" smtClean="0"/>
+              <a:t/>
+            </a:r>
+            <a:br>
+              <a:rPr lang="pt-BR" altLang="pt-BR" sz="3000" b="1" dirty="0" smtClean="0"/>
+            </a:br>
+            <a:r>
+              <a:rPr lang="pt-BR" altLang="pt-BR" sz="3000" b="1" dirty="0" smtClean="0"/>
+              <a:t>- Problema educacional no Brasil</a:t>
+            </a:r>
+            <a:br>
+              <a:rPr lang="pt-BR" altLang="pt-BR" sz="3000" b="1" dirty="0" smtClean="0"/>
+            </a:br>
+            <a:r>
+              <a:rPr lang="pt-BR" altLang="pt-BR" sz="3000" b="1" dirty="0" smtClean="0"/>
+              <a:t/>
+            </a:r>
+            <a:br>
+              <a:rPr lang="pt-BR" altLang="pt-BR" sz="3000" b="1" dirty="0" smtClean="0"/>
+            </a:br>
+            <a:r>
+              <a:rPr lang="pt-BR" altLang="pt-BR" sz="3000" b="1" dirty="0" smtClean="0"/>
+              <a:t>- Consumo cultural mais elitizado</a:t>
+            </a:r>
+            <a:br>
+              <a:rPr lang="pt-BR" altLang="pt-BR" sz="3000" b="1" dirty="0" smtClean="0"/>
+            </a:br>
+            <a:r>
+              <a:rPr lang="pt-BR" altLang="pt-BR" sz="3000" b="1" dirty="0" smtClean="0"/>
+              <a:t/>
+            </a:r>
+            <a:br>
+              <a:rPr lang="pt-BR" altLang="pt-BR" sz="3000" b="1" dirty="0" smtClean="0"/>
+            </a:br>
+            <a:r>
+              <a:rPr lang="pt-BR" altLang="pt-BR" sz="3000" b="1" dirty="0" smtClean="0"/>
+              <a:t>- Democratização impulsionada pela tecnologia</a:t>
+            </a:r>
+            <a:endParaRPr lang="pt-BR" altLang="pt-BR" sz="3000" b="1" dirty="0" smtClean="0">
+              <a:latin typeface="Bahnschrift SemiBold Condensed" panose="020B0502040204020203" pitchFamily="34" charset="0"/>
+            </a:endParaRPr>
+          </a:p>
+        </p:txBody>
+      </p:sp>
+      <p:sp>
+        <p:nvSpPr>
+          <p:cNvPr id="3076" name="Título 1"/>
+          <p:cNvSpPr txBox="1">
+            <a:spLocks/>
+          </p:cNvSpPr>
+          <p:nvPr/>
+        </p:nvSpPr>
+        <p:spPr bwMode="auto">
+          <a:xfrm>
+            <a:off x="-639763" y="930275"/>
+            <a:ext cx="9144001" cy="1231900"/>
+          </a:xfrm>
+          <a:prstGeom prst="rect">
+            <a:avLst/>
+          </a:prstGeom>
+          <a:noFill/>
+          <a:ln>
+            <a:noFill/>
+          </a:ln>
+          <a:extLst>
+            <a:ext uri="{909E8E84-426E-40DD-AFC4-6F175D3DCCD1}">
+              <a14:hiddenFill xmlns:a14="http://schemas.microsoft.com/office/drawing/2010/main">
+                <a:solidFill>
+                  <a:srgbClr val="FFFFFF"/>
+                </a:solidFill>
+              </a14:hiddenFill>
+            </a:ext>
+            <a:ext uri="{91240B29-F687-4F45-9708-019B960494DF}">
+              <a14:hiddenLine xmlns:a14="http://schemas.microsoft.com/office/drawing/2010/main" w="9525">
+                <a:solidFill>
+                  <a:srgbClr val="000000"/>
+                </a:solidFill>
+                <a:miter lim="800000"/>
+                <a:headEnd/>
+                <a:tailEnd/>
+              </a14:hiddenLine>
+            </a:ext>
+          </a:extLst>
+        </p:spPr>
+        <p:txBody>
+          <a:bodyPr anchor="b"/>
+          <a:lstStyle>
+            <a:lvl1pPr>
+              <a:defRPr>
+                <a:solidFill>
+                  <a:schemeClr val="tx1"/>
+                </a:solidFill>
+                <a:latin typeface="Calibri" panose="020F0502020204030204" pitchFamily="34" charset="0"/>
+              </a:defRPr>
+            </a:lvl1pPr>
+            <a:lvl2pPr marL="742950" indent="-285750">
+              <a:defRPr>
+                <a:solidFill>
+                  <a:schemeClr val="tx1"/>
+                </a:solidFill>
+                <a:latin typeface="Calibri" panose="020F0502020204030204" pitchFamily="34" charset="0"/>
+              </a:defRPr>
+            </a:lvl2pPr>
+            <a:lvl3pPr marL="1143000" indent="-228600">
+              <a:defRPr>
+                <a:solidFill>
+                  <a:schemeClr val="tx1"/>
+                </a:solidFill>
+                <a:latin typeface="Calibri" panose="020F0502020204030204" pitchFamily="34" charset="0"/>
+              </a:defRPr>
+            </a:lvl3pPr>
+            <a:lvl4pPr marL="1600200" indent="-228600">
+              <a:defRPr>
+                <a:solidFill>
+                  <a:schemeClr val="tx1"/>
+                </a:solidFill>
+                <a:latin typeface="Calibri" panose="020F0502020204030204" pitchFamily="34" charset="0"/>
+              </a:defRPr>
+            </a:lvl4pPr>
+            <a:lvl5pPr marL="2057400" indent="-228600">
+              <a:defRPr>
+                <a:solidFill>
+                  <a:schemeClr val="tx1"/>
+                </a:solidFill>
+                <a:latin typeface="Calibri" panose="020F0502020204030204" pitchFamily="34" charset="0"/>
+              </a:defRPr>
+            </a:lvl5pPr>
+            <a:lvl6pPr marL="2514600" indent="-228600" fontAlgn="base">
+              <a:spcBef>
+                <a:spcPct val="0"/>
+              </a:spcBef>
+              <a:spcAft>
+                <a:spcPct val="0"/>
+              </a:spcAft>
+              <a:defRPr>
+                <a:solidFill>
+                  <a:schemeClr val="tx1"/>
+                </a:solidFill>
+                <a:latin typeface="Calibri" panose="020F0502020204030204" pitchFamily="34" charset="0"/>
+              </a:defRPr>
+            </a:lvl6pPr>
+            <a:lvl7pPr marL="2971800" indent="-228600" fontAlgn="base">
+              <a:spcBef>
+                <a:spcPct val="0"/>
+              </a:spcBef>
+              <a:spcAft>
+                <a:spcPct val="0"/>
+              </a:spcAft>
+              <a:defRPr>
+                <a:solidFill>
+                  <a:schemeClr val="tx1"/>
+                </a:solidFill>
+                <a:latin typeface="Calibri" panose="020F0502020204030204" pitchFamily="34" charset="0"/>
+              </a:defRPr>
+            </a:lvl7pPr>
+            <a:lvl8pPr marL="3429000" indent="-228600" fontAlgn="base">
+              <a:spcBef>
+                <a:spcPct val="0"/>
+              </a:spcBef>
+              <a:spcAft>
+                <a:spcPct val="0"/>
+              </a:spcAft>
+              <a:defRPr>
+                <a:solidFill>
+                  <a:schemeClr val="tx1"/>
+                </a:solidFill>
+                <a:latin typeface="Calibri" panose="020F0502020204030204" pitchFamily="34" charset="0"/>
+              </a:defRPr>
+            </a:lvl8pPr>
+            <a:lvl9pPr marL="3886200" indent="-228600" fontAlgn="base">
+              <a:spcBef>
+                <a:spcPct val="0"/>
+              </a:spcBef>
+              <a:spcAft>
+                <a:spcPct val="0"/>
+              </a:spcAft>
+              <a:defRPr>
+                <a:solidFill>
+                  <a:schemeClr val="tx1"/>
+                </a:solidFill>
+                <a:latin typeface="Calibri" panose="020F0502020204030204" pitchFamily="34" charset="0"/>
+              </a:defRPr>
+            </a:lvl9pPr>
+          </a:lstStyle>
+          <a:p>
+            <a:pPr algn="ctr" eaLnBrk="1" hangingPunct="1">
+              <a:lnSpc>
+                <a:spcPct val="90000"/>
+              </a:lnSpc>
+            </a:pPr>
+            <a:r>
               <a:rPr lang="pt-BR" altLang="pt-BR" sz="7500">
                 <a:latin typeface="Bahnschrift SemiBold Condensed" panose="020B0502040204020203" pitchFamily="34" charset="0"/>
               </a:rPr>
@@ -4072,7 +4443,7 @@
 </p:sld>
 </file>
 
-<file path=ppt/slides/slide3.xml><?xml version="1.0" encoding="utf-8"?>
+<file path=ppt/slides/slide4.xml><?xml version="1.0" encoding="utf-8"?>
 <p:sld xmlns:a="http://schemas.openxmlformats.org/drawingml/2006/main" xmlns:r="http://schemas.openxmlformats.org/officeDocument/2006/relationships" xmlns:p="http://schemas.openxmlformats.org/presentationml/2006/main">
   <p:cSld>
     <p:bg>

</xml_diff>